<commit_message>
Add fullslide_half chart type
</commit_message>
<xml_diff>
--- a/inst/extdata/template_fullslide_narrow.pptx
+++ b/inst/extdata/template_fullslide_narrow.pptx
@@ -203,7 +203,7 @@
           <a:p>
             <a:fld id="{E6375376-077A-8F42-9E71-155E70FB596E}" type="datetimeFigureOut">
               <a:rPr lang="en-US" smtClean="0"/>
-              <a:t>4/3/25</a:t>
+              <a:t>12/3/25</a:t>
             </a:fld>
             <a:endParaRPr lang="en-US"/>
           </a:p>
@@ -1153,7 +1153,7 @@
           <a:p>
             <a:fld id="{184C34C6-D93D-964F-98F1-8B05274CB5BF}" type="datetimeFigureOut">
               <a:rPr lang="en-US" smtClean="0"/>
-              <a:t>4/3/25</a:t>
+              <a:t>12/3/25</a:t>
             </a:fld>
             <a:endParaRPr lang="en-US"/>
           </a:p>
@@ -1374,7 +1374,7 @@
           <a:p>
             <a:fld id="{184C34C6-D93D-964F-98F1-8B05274CB5BF}" type="datetimeFigureOut">
               <a:rPr lang="en-US" smtClean="0"/>
-              <a:t>4/3/25</a:t>
+              <a:t>12/3/25</a:t>
             </a:fld>
             <a:endParaRPr lang="en-US" dirty="0"/>
           </a:p>
@@ -1698,7 +1698,7 @@
           <a:p>
             <a:fld id="{184C34C6-D93D-964F-98F1-8B05274CB5BF}" type="datetimeFigureOut">
               <a:rPr lang="en-US" smtClean="0"/>
-              <a:t>4/3/25</a:t>
+              <a:t>12/3/25</a:t>
             </a:fld>
             <a:endParaRPr lang="en-US" dirty="0"/>
           </a:p>
@@ -2215,7 +2215,7 @@
           <a:p>
             <a:fld id="{184C34C6-D93D-964F-98F1-8B05274CB5BF}" type="datetimeFigureOut">
               <a:rPr lang="en-US" smtClean="0"/>
-              <a:t>4/3/25</a:t>
+              <a:t>12/3/25</a:t>
             </a:fld>
             <a:endParaRPr lang="en-US" dirty="0"/>
           </a:p>
@@ -2571,7 +2571,7 @@
         <p:spPr>
           <a:xfrm>
             <a:off x="1894800" y="1807200"/>
-            <a:ext cx="8402400" cy="4284662"/>
+            <a:ext cx="8352000" cy="4284662"/>
           </a:xfrm>
         </p:spPr>
         <p:txBody>
@@ -2579,10 +2579,10 @@
           <a:lstStyle/>
           <a:p>
             <a:r>
-              <a:rPr lang="en-GB"/>
+              <a:rPr lang="en-GB" dirty="0"/>
               <a:t>Click icon to add chart</a:t>
             </a:r>
-            <a:endParaRPr lang="en-AU"/>
+            <a:endParaRPr lang="en-AU" dirty="0"/>
           </a:p>
         </p:txBody>
       </p:sp>
@@ -2874,7 +2874,7 @@
           <a:p>
             <a:fld id="{184C34C6-D93D-964F-98F1-8B05274CB5BF}" type="datetimeFigureOut">
               <a:rPr lang="en-AU" noProof="0" smtClean="0"/>
-              <a:t>3/4/2025</a:t>
+              <a:t>3/12/2025</a:t>
             </a:fld>
             <a:endParaRPr lang="en-AU" noProof="0"/>
           </a:p>

</xml_diff>